<commit_message>
Added workflow slide to PPT
</commit_message>
<xml_diff>
--- a/images/CareShare.pptx
+++ b/images/CareShare.pptx
@@ -9,6 +9,7 @@
     <p:sldId id="257" r:id="rId3"/>
     <p:sldId id="258" r:id="rId4"/>
     <p:sldId id="259" r:id="rId5"/>
+    <p:sldId id="260" r:id="rId6"/>
   </p:sldIdLst>
   <p:sldSz cx="12192000" cy="6858000"/>
   <p:notesSz cx="6858000" cy="9144000"/>
@@ -275,7 +276,7 @@
           <a:p>
             <a:fld id="{63D1AD1D-55EE-456D-80BD-74D66DB9EF9C}" type="datetimeFigureOut">
               <a:rPr lang="en-GB" smtClean="0"/>
-              <a:t>02/05/2022</a:t>
+              <a:t>15/05/2022</a:t>
             </a:fld>
             <a:endParaRPr lang="en-GB"/>
           </a:p>
@@ -475,7 +476,7 @@
           <a:p>
             <a:fld id="{63D1AD1D-55EE-456D-80BD-74D66DB9EF9C}" type="datetimeFigureOut">
               <a:rPr lang="en-GB" smtClean="0"/>
-              <a:t>02/05/2022</a:t>
+              <a:t>15/05/2022</a:t>
             </a:fld>
             <a:endParaRPr lang="en-GB"/>
           </a:p>
@@ -685,7 +686,7 @@
           <a:p>
             <a:fld id="{63D1AD1D-55EE-456D-80BD-74D66DB9EF9C}" type="datetimeFigureOut">
               <a:rPr lang="en-GB" smtClean="0"/>
-              <a:t>02/05/2022</a:t>
+              <a:t>15/05/2022</a:t>
             </a:fld>
             <a:endParaRPr lang="en-GB"/>
           </a:p>
@@ -885,7 +886,7 @@
           <a:p>
             <a:fld id="{63D1AD1D-55EE-456D-80BD-74D66DB9EF9C}" type="datetimeFigureOut">
               <a:rPr lang="en-GB" smtClean="0"/>
-              <a:t>02/05/2022</a:t>
+              <a:t>15/05/2022</a:t>
             </a:fld>
             <a:endParaRPr lang="en-GB"/>
           </a:p>
@@ -1161,7 +1162,7 @@
           <a:p>
             <a:fld id="{63D1AD1D-55EE-456D-80BD-74D66DB9EF9C}" type="datetimeFigureOut">
               <a:rPr lang="en-GB" smtClean="0"/>
-              <a:t>02/05/2022</a:t>
+              <a:t>15/05/2022</a:t>
             </a:fld>
             <a:endParaRPr lang="en-GB"/>
           </a:p>
@@ -1429,7 +1430,7 @@
           <a:p>
             <a:fld id="{63D1AD1D-55EE-456D-80BD-74D66DB9EF9C}" type="datetimeFigureOut">
               <a:rPr lang="en-GB" smtClean="0"/>
-              <a:t>02/05/2022</a:t>
+              <a:t>15/05/2022</a:t>
             </a:fld>
             <a:endParaRPr lang="en-GB"/>
           </a:p>
@@ -1844,7 +1845,7 @@
           <a:p>
             <a:fld id="{63D1AD1D-55EE-456D-80BD-74D66DB9EF9C}" type="datetimeFigureOut">
               <a:rPr lang="en-GB" smtClean="0"/>
-              <a:t>02/05/2022</a:t>
+              <a:t>15/05/2022</a:t>
             </a:fld>
             <a:endParaRPr lang="en-GB"/>
           </a:p>
@@ -1986,7 +1987,7 @@
           <a:p>
             <a:fld id="{63D1AD1D-55EE-456D-80BD-74D66DB9EF9C}" type="datetimeFigureOut">
               <a:rPr lang="en-GB" smtClean="0"/>
-              <a:t>02/05/2022</a:t>
+              <a:t>15/05/2022</a:t>
             </a:fld>
             <a:endParaRPr lang="en-GB"/>
           </a:p>
@@ -2099,7 +2100,7 @@
           <a:p>
             <a:fld id="{63D1AD1D-55EE-456D-80BD-74D66DB9EF9C}" type="datetimeFigureOut">
               <a:rPr lang="en-GB" smtClean="0"/>
-              <a:t>02/05/2022</a:t>
+              <a:t>15/05/2022</a:t>
             </a:fld>
             <a:endParaRPr lang="en-GB"/>
           </a:p>
@@ -2412,7 +2413,7 @@
           <a:p>
             <a:fld id="{63D1AD1D-55EE-456D-80BD-74D66DB9EF9C}" type="datetimeFigureOut">
               <a:rPr lang="en-GB" smtClean="0"/>
-              <a:t>02/05/2022</a:t>
+              <a:t>15/05/2022</a:t>
             </a:fld>
             <a:endParaRPr lang="en-GB"/>
           </a:p>
@@ -2701,7 +2702,7 @@
           <a:p>
             <a:fld id="{63D1AD1D-55EE-456D-80BD-74D66DB9EF9C}" type="datetimeFigureOut">
               <a:rPr lang="en-GB" smtClean="0"/>
-              <a:t>02/05/2022</a:t>
+              <a:t>15/05/2022</a:t>
             </a:fld>
             <a:endParaRPr lang="en-GB"/>
           </a:p>
@@ -2944,7 +2945,7 @@
           <a:p>
             <a:fld id="{63D1AD1D-55EE-456D-80BD-74D66DB9EF9C}" type="datetimeFigureOut">
               <a:rPr lang="en-GB" smtClean="0"/>
-              <a:t>02/05/2022</a:t>
+              <a:t>15/05/2022</a:t>
             </a:fld>
             <a:endParaRPr lang="en-GB"/>
           </a:p>
@@ -4879,6 +4880,1548 @@
 </p:sld>
 </file>
 
+<file path=ppt/slides/slide5.xml><?xml version="1.0" encoding="utf-8"?>
+<p:sld xmlns:a="http://schemas.openxmlformats.org/drawingml/2006/main" xmlns:r="http://schemas.openxmlformats.org/officeDocument/2006/relationships" xmlns:p="http://schemas.openxmlformats.org/presentationml/2006/main">
+  <p:cSld>
+    <p:spTree>
+      <p:nvGrpSpPr>
+        <p:cNvPr id="1" name=""/>
+        <p:cNvGrpSpPr/>
+        <p:nvPr/>
+      </p:nvGrpSpPr>
+      <p:grpSpPr>
+        <a:xfrm>
+          <a:off x="0" y="0"/>
+          <a:ext cx="0" cy="0"/>
+          <a:chOff x="0" y="0"/>
+          <a:chExt cx="0" cy="0"/>
+        </a:xfrm>
+      </p:grpSpPr>
+      <p:sp>
+        <p:nvSpPr>
+          <p:cNvPr id="2" name="Title 1">
+            <a:extLst>
+              <a:ext uri="{FF2B5EF4-FFF2-40B4-BE49-F238E27FC236}">
+                <a16:creationId xmlns:a16="http://schemas.microsoft.com/office/drawing/2014/main" id="{4BF505D4-5378-F310-1A71-B75493B2C933}"/>
+              </a:ext>
+            </a:extLst>
+          </p:cNvPr>
+          <p:cNvSpPr>
+            <a:spLocks noGrp="1"/>
+          </p:cNvSpPr>
+          <p:nvPr>
+            <p:ph type="title"/>
+          </p:nvPr>
+        </p:nvSpPr>
+        <p:spPr>
+          <a:xfrm>
+            <a:off x="8956606" y="745869"/>
+            <a:ext cx="2743200" cy="830141"/>
+          </a:xfrm>
+        </p:spPr>
+        <p:txBody>
+          <a:bodyPr>
+            <a:normAutofit fontScale="90000"/>
+          </a:bodyPr>
+          <a:lstStyle/>
+          <a:p>
+            <a:pPr algn="r"/>
+            <a:r>
+              <a:rPr lang="en-GB" dirty="0"/>
+              <a:t>Task Workflow</a:t>
+            </a:r>
+          </a:p>
+        </p:txBody>
+      </p:sp>
+      <p:sp>
+        <p:nvSpPr>
+          <p:cNvPr id="32" name="Rectangle 31">
+            <a:extLst>
+              <a:ext uri="{FF2B5EF4-FFF2-40B4-BE49-F238E27FC236}">
+                <a16:creationId xmlns:a16="http://schemas.microsoft.com/office/drawing/2014/main" id="{EFA322A9-D178-4431-517C-B89DF9E8CF07}"/>
+              </a:ext>
+            </a:extLst>
+          </p:cNvPr>
+          <p:cNvSpPr/>
+          <p:nvPr/>
+        </p:nvSpPr>
+        <p:spPr>
+          <a:xfrm>
+            <a:off x="1736793" y="1072004"/>
+            <a:ext cx="1089219" cy="1068897"/>
+          </a:xfrm>
+          <a:prstGeom prst="rect">
+            <a:avLst/>
+          </a:prstGeom>
+        </p:spPr>
+        <p:style>
+          <a:lnRef idx="2">
+            <a:schemeClr val="accent1">
+              <a:shade val="50000"/>
+            </a:schemeClr>
+          </a:lnRef>
+          <a:fillRef idx="1">
+            <a:schemeClr val="accent1"/>
+          </a:fillRef>
+          <a:effectRef idx="0">
+            <a:schemeClr val="accent1"/>
+          </a:effectRef>
+          <a:fontRef idx="minor">
+            <a:schemeClr val="lt1"/>
+          </a:fontRef>
+        </p:style>
+        <p:txBody>
+          <a:bodyPr lIns="0" rIns="0" rtlCol="0" anchor="ctr"/>
+          <a:lstStyle/>
+          <a:p>
+            <a:pPr algn="ctr"/>
+            <a:r>
+              <a:rPr lang="en-GB" dirty="0"/>
+              <a:t>Draft</a:t>
+            </a:r>
+          </a:p>
+        </p:txBody>
+      </p:sp>
+      <p:sp>
+        <p:nvSpPr>
+          <p:cNvPr id="33" name="Rectangle 32">
+            <a:extLst>
+              <a:ext uri="{FF2B5EF4-FFF2-40B4-BE49-F238E27FC236}">
+                <a16:creationId xmlns:a16="http://schemas.microsoft.com/office/drawing/2014/main" id="{B0A196CD-38EF-0812-8214-8376ACD93228}"/>
+              </a:ext>
+            </a:extLst>
+          </p:cNvPr>
+          <p:cNvSpPr/>
+          <p:nvPr/>
+        </p:nvSpPr>
+        <p:spPr>
+          <a:xfrm>
+            <a:off x="3977995" y="1072003"/>
+            <a:ext cx="1089219" cy="1068897"/>
+          </a:xfrm>
+          <a:prstGeom prst="rect">
+            <a:avLst/>
+          </a:prstGeom>
+        </p:spPr>
+        <p:style>
+          <a:lnRef idx="2">
+            <a:schemeClr val="accent1">
+              <a:shade val="50000"/>
+            </a:schemeClr>
+          </a:lnRef>
+          <a:fillRef idx="1">
+            <a:schemeClr val="accent1"/>
+          </a:fillRef>
+          <a:effectRef idx="0">
+            <a:schemeClr val="accent1"/>
+          </a:effectRef>
+          <a:fontRef idx="minor">
+            <a:schemeClr val="lt1"/>
+          </a:fontRef>
+        </p:style>
+        <p:txBody>
+          <a:bodyPr lIns="0" rIns="0" rtlCol="0" anchor="ctr"/>
+          <a:lstStyle/>
+          <a:p>
+            <a:pPr algn="ctr"/>
+            <a:r>
+              <a:rPr lang="en-GB" dirty="0"/>
+              <a:t>Created</a:t>
+            </a:r>
+          </a:p>
+        </p:txBody>
+      </p:sp>
+      <p:sp>
+        <p:nvSpPr>
+          <p:cNvPr id="35" name="Rectangle 34">
+            <a:extLst>
+              <a:ext uri="{FF2B5EF4-FFF2-40B4-BE49-F238E27FC236}">
+                <a16:creationId xmlns:a16="http://schemas.microsoft.com/office/drawing/2014/main" id="{AE06D5CD-FAE6-02FB-DB3F-EEAC24DB83D6}"/>
+              </a:ext>
+            </a:extLst>
+          </p:cNvPr>
+          <p:cNvSpPr/>
+          <p:nvPr/>
+        </p:nvSpPr>
+        <p:spPr>
+          <a:xfrm>
+            <a:off x="3977995" y="3264329"/>
+            <a:ext cx="1089219" cy="1068897"/>
+          </a:xfrm>
+          <a:prstGeom prst="rect">
+            <a:avLst/>
+          </a:prstGeom>
+        </p:spPr>
+        <p:style>
+          <a:lnRef idx="2">
+            <a:schemeClr val="accent1">
+              <a:shade val="50000"/>
+            </a:schemeClr>
+          </a:lnRef>
+          <a:fillRef idx="1">
+            <a:schemeClr val="accent1"/>
+          </a:fillRef>
+          <a:effectRef idx="0">
+            <a:schemeClr val="accent1"/>
+          </a:effectRef>
+          <a:fontRef idx="minor">
+            <a:schemeClr val="lt1"/>
+          </a:fontRef>
+        </p:style>
+        <p:txBody>
+          <a:bodyPr lIns="0" rIns="0" rtlCol="0" anchor="ctr"/>
+          <a:lstStyle/>
+          <a:p>
+            <a:pPr algn="ctr"/>
+            <a:r>
+              <a:rPr lang="en-GB" dirty="0"/>
+              <a:t>Assigned</a:t>
+            </a:r>
+          </a:p>
+        </p:txBody>
+      </p:sp>
+      <p:sp>
+        <p:nvSpPr>
+          <p:cNvPr id="36" name="Rectangle 35">
+            <a:extLst>
+              <a:ext uri="{FF2B5EF4-FFF2-40B4-BE49-F238E27FC236}">
+                <a16:creationId xmlns:a16="http://schemas.microsoft.com/office/drawing/2014/main" id="{8D96A27C-2765-3584-6C5A-D453CFE69AB7}"/>
+              </a:ext>
+            </a:extLst>
+          </p:cNvPr>
+          <p:cNvSpPr/>
+          <p:nvPr/>
+        </p:nvSpPr>
+        <p:spPr>
+          <a:xfrm>
+            <a:off x="6569193" y="3270679"/>
+            <a:ext cx="1089219" cy="1068897"/>
+          </a:xfrm>
+          <a:prstGeom prst="rect">
+            <a:avLst/>
+          </a:prstGeom>
+        </p:spPr>
+        <p:style>
+          <a:lnRef idx="2">
+            <a:schemeClr val="accent1">
+              <a:shade val="50000"/>
+            </a:schemeClr>
+          </a:lnRef>
+          <a:fillRef idx="1">
+            <a:schemeClr val="accent1"/>
+          </a:fillRef>
+          <a:effectRef idx="0">
+            <a:schemeClr val="accent1"/>
+          </a:effectRef>
+          <a:fontRef idx="minor">
+            <a:schemeClr val="lt1"/>
+          </a:fontRef>
+        </p:style>
+        <p:txBody>
+          <a:bodyPr lIns="0" rIns="0" rtlCol="0" anchor="ctr"/>
+          <a:lstStyle/>
+          <a:p>
+            <a:pPr algn="ctr"/>
+            <a:r>
+              <a:rPr lang="en-GB" dirty="0"/>
+              <a:t>Accepted</a:t>
+            </a:r>
+          </a:p>
+        </p:txBody>
+      </p:sp>
+      <p:sp>
+        <p:nvSpPr>
+          <p:cNvPr id="37" name="Rectangle 36">
+            <a:extLst>
+              <a:ext uri="{FF2B5EF4-FFF2-40B4-BE49-F238E27FC236}">
+                <a16:creationId xmlns:a16="http://schemas.microsoft.com/office/drawing/2014/main" id="{E76962C7-304C-CC13-B869-BCE614E44C50}"/>
+              </a:ext>
+            </a:extLst>
+          </p:cNvPr>
+          <p:cNvSpPr/>
+          <p:nvPr/>
+        </p:nvSpPr>
+        <p:spPr>
+          <a:xfrm>
+            <a:off x="9160391" y="3270679"/>
+            <a:ext cx="1089219" cy="1068897"/>
+          </a:xfrm>
+          <a:prstGeom prst="rect">
+            <a:avLst/>
+          </a:prstGeom>
+        </p:spPr>
+        <p:style>
+          <a:lnRef idx="2">
+            <a:schemeClr val="accent1">
+              <a:shade val="50000"/>
+            </a:schemeClr>
+          </a:lnRef>
+          <a:fillRef idx="1">
+            <a:schemeClr val="accent1"/>
+          </a:fillRef>
+          <a:effectRef idx="0">
+            <a:schemeClr val="accent1"/>
+          </a:effectRef>
+          <a:fontRef idx="minor">
+            <a:schemeClr val="lt1"/>
+          </a:fontRef>
+        </p:style>
+        <p:txBody>
+          <a:bodyPr lIns="0" rIns="0" rtlCol="0" anchor="ctr"/>
+          <a:lstStyle/>
+          <a:p>
+            <a:pPr algn="ctr"/>
+            <a:r>
+              <a:rPr lang="en-GB" dirty="0"/>
+              <a:t>Completed</a:t>
+            </a:r>
+          </a:p>
+        </p:txBody>
+      </p:sp>
+      <p:sp>
+        <p:nvSpPr>
+          <p:cNvPr id="38" name="Rectangle 37">
+            <a:extLst>
+              <a:ext uri="{FF2B5EF4-FFF2-40B4-BE49-F238E27FC236}">
+                <a16:creationId xmlns:a16="http://schemas.microsoft.com/office/drawing/2014/main" id="{5D25D5AF-25A6-6154-E67E-D502BEE4B1FE}"/>
+              </a:ext>
+            </a:extLst>
+          </p:cNvPr>
+          <p:cNvSpPr/>
+          <p:nvPr/>
+        </p:nvSpPr>
+        <p:spPr>
+          <a:xfrm>
+            <a:off x="9160391" y="5595408"/>
+            <a:ext cx="1089219" cy="1068897"/>
+          </a:xfrm>
+          <a:prstGeom prst="rect">
+            <a:avLst/>
+          </a:prstGeom>
+        </p:spPr>
+        <p:style>
+          <a:lnRef idx="2">
+            <a:schemeClr val="accent1">
+              <a:shade val="50000"/>
+            </a:schemeClr>
+          </a:lnRef>
+          <a:fillRef idx="1">
+            <a:schemeClr val="accent1"/>
+          </a:fillRef>
+          <a:effectRef idx="0">
+            <a:schemeClr val="accent1"/>
+          </a:effectRef>
+          <a:fontRef idx="minor">
+            <a:schemeClr val="lt1"/>
+          </a:fontRef>
+        </p:style>
+        <p:txBody>
+          <a:bodyPr lIns="0" rIns="0" rtlCol="0" anchor="ctr"/>
+          <a:lstStyle/>
+          <a:p>
+            <a:pPr algn="ctr"/>
+            <a:r>
+              <a:rPr lang="en-GB" dirty="0"/>
+              <a:t>Archived</a:t>
+            </a:r>
+          </a:p>
+        </p:txBody>
+      </p:sp>
+      <p:cxnSp>
+        <p:nvCxnSpPr>
+          <p:cNvPr id="39" name="Connector: Curved 38">
+            <a:extLst>
+              <a:ext uri="{FF2B5EF4-FFF2-40B4-BE49-F238E27FC236}">
+                <a16:creationId xmlns:a16="http://schemas.microsoft.com/office/drawing/2014/main" id="{912A5E37-17E8-32A9-0928-10D9AFD53BDD}"/>
+              </a:ext>
+            </a:extLst>
+          </p:cNvPr>
+          <p:cNvCxnSpPr>
+            <a:cxnSpLocks/>
+            <a:stCxn id="35" idx="0"/>
+            <a:endCxn id="33" idx="2"/>
+          </p:cNvCxnSpPr>
+          <p:nvPr/>
+        </p:nvCxnSpPr>
+        <p:spPr>
+          <a:xfrm rot="5400000" flipH="1" flipV="1">
+            <a:off x="3960891" y="2702615"/>
+            <a:ext cx="1123429" cy="12700"/>
+          </a:xfrm>
+          <a:prstGeom prst="curvedConnector3">
+            <a:avLst>
+              <a:gd name="adj1" fmla="val 50000"/>
+            </a:avLst>
+          </a:prstGeom>
+          <a:ln w="38100">
+            <a:tailEnd type="triangle"/>
+          </a:ln>
+        </p:spPr>
+        <p:style>
+          <a:lnRef idx="1">
+            <a:schemeClr val="accent1"/>
+          </a:lnRef>
+          <a:fillRef idx="0">
+            <a:schemeClr val="accent1"/>
+          </a:fillRef>
+          <a:effectRef idx="0">
+            <a:schemeClr val="accent1"/>
+          </a:effectRef>
+          <a:fontRef idx="minor">
+            <a:schemeClr val="tx1"/>
+          </a:fontRef>
+        </p:style>
+      </p:cxnSp>
+      <p:cxnSp>
+        <p:nvCxnSpPr>
+          <p:cNvPr id="40" name="Connector: Curved 39">
+            <a:extLst>
+              <a:ext uri="{FF2B5EF4-FFF2-40B4-BE49-F238E27FC236}">
+                <a16:creationId xmlns:a16="http://schemas.microsoft.com/office/drawing/2014/main" id="{AACE4E77-1849-6FC0-36AA-60FCEDF04DC5}"/>
+              </a:ext>
+            </a:extLst>
+          </p:cNvPr>
+          <p:cNvCxnSpPr>
+            <a:cxnSpLocks/>
+            <a:endCxn id="32" idx="1"/>
+          </p:cNvCxnSpPr>
+          <p:nvPr/>
+        </p:nvCxnSpPr>
+        <p:spPr>
+          <a:xfrm>
+            <a:off x="558800" y="1606453"/>
+            <a:ext cx="1177993" cy="12700"/>
+          </a:xfrm>
+          <a:prstGeom prst="curvedConnector3">
+            <a:avLst>
+              <a:gd name="adj1" fmla="val 50000"/>
+            </a:avLst>
+          </a:prstGeom>
+          <a:ln w="38100">
+            <a:tailEnd type="triangle"/>
+          </a:ln>
+        </p:spPr>
+        <p:style>
+          <a:lnRef idx="1">
+            <a:schemeClr val="accent1"/>
+          </a:lnRef>
+          <a:fillRef idx="0">
+            <a:schemeClr val="accent1"/>
+          </a:fillRef>
+          <a:effectRef idx="0">
+            <a:schemeClr val="accent1"/>
+          </a:effectRef>
+          <a:fontRef idx="minor">
+            <a:schemeClr val="tx1"/>
+          </a:fontRef>
+        </p:style>
+      </p:cxnSp>
+      <p:sp>
+        <p:nvSpPr>
+          <p:cNvPr id="43" name="TextBox 42">
+            <a:extLst>
+              <a:ext uri="{FF2B5EF4-FFF2-40B4-BE49-F238E27FC236}">
+                <a16:creationId xmlns:a16="http://schemas.microsoft.com/office/drawing/2014/main" id="{364DDCF4-5D84-B21D-D7C7-CD2F431DAFCF}"/>
+              </a:ext>
+            </a:extLst>
+          </p:cNvPr>
+          <p:cNvSpPr txBox="1"/>
+          <p:nvPr/>
+        </p:nvSpPr>
+        <p:spPr>
+          <a:xfrm>
+            <a:off x="492194" y="598487"/>
+            <a:ext cx="1177993" cy="954107"/>
+          </a:xfrm>
+          <a:prstGeom prst="rect">
+            <a:avLst/>
+          </a:prstGeom>
+          <a:noFill/>
+        </p:spPr>
+        <p:txBody>
+          <a:bodyPr wrap="square" rtlCol="0">
+            <a:spAutoFit/>
+          </a:bodyPr>
+          <a:lstStyle/>
+          <a:p>
+            <a:pPr algn="ctr"/>
+            <a:r>
+              <a:rPr lang="en-GB" sz="1400" dirty="0"/>
+              <a:t>User 1 creates Task from Home Page</a:t>
+            </a:r>
+          </a:p>
+        </p:txBody>
+      </p:sp>
+      <p:sp>
+        <p:nvSpPr>
+          <p:cNvPr id="44" name="TextBox 43">
+            <a:extLst>
+              <a:ext uri="{FF2B5EF4-FFF2-40B4-BE49-F238E27FC236}">
+                <a16:creationId xmlns:a16="http://schemas.microsoft.com/office/drawing/2014/main" id="{9694C0F9-93B2-95B6-05EB-05615F394A2F}"/>
+              </a:ext>
+            </a:extLst>
+          </p:cNvPr>
+          <p:cNvSpPr txBox="1"/>
+          <p:nvPr/>
+        </p:nvSpPr>
+        <p:spPr>
+          <a:xfrm>
+            <a:off x="2800002" y="813930"/>
+            <a:ext cx="1177993" cy="738664"/>
+          </a:xfrm>
+          <a:prstGeom prst="rect">
+            <a:avLst/>
+          </a:prstGeom>
+          <a:noFill/>
+        </p:spPr>
+        <p:txBody>
+          <a:bodyPr wrap="square" rtlCol="0">
+            <a:spAutoFit/>
+          </a:bodyPr>
+          <a:lstStyle/>
+          <a:p>
+            <a:pPr algn="ctr"/>
+            <a:r>
+              <a:rPr lang="en-GB" sz="1400" dirty="0"/>
+              <a:t>User 1 enters details and hits </a:t>
+            </a:r>
+            <a:r>
+              <a:rPr lang="en-GB" sz="1400" b="1" dirty="0"/>
+              <a:t>Create</a:t>
+            </a:r>
+          </a:p>
+        </p:txBody>
+      </p:sp>
+      <p:cxnSp>
+        <p:nvCxnSpPr>
+          <p:cNvPr id="45" name="Connector: Curved 44">
+            <a:extLst>
+              <a:ext uri="{FF2B5EF4-FFF2-40B4-BE49-F238E27FC236}">
+                <a16:creationId xmlns:a16="http://schemas.microsoft.com/office/drawing/2014/main" id="{61B1C047-4D93-DCD4-BB46-282E51A6E798}"/>
+              </a:ext>
+            </a:extLst>
+          </p:cNvPr>
+          <p:cNvCxnSpPr>
+            <a:cxnSpLocks/>
+            <a:stCxn id="32" idx="3"/>
+            <a:endCxn id="33" idx="1"/>
+          </p:cNvCxnSpPr>
+          <p:nvPr/>
+        </p:nvCxnSpPr>
+        <p:spPr>
+          <a:xfrm flipV="1">
+            <a:off x="2826012" y="1606452"/>
+            <a:ext cx="1151983" cy="1"/>
+          </a:xfrm>
+          <a:prstGeom prst="curvedConnector3">
+            <a:avLst>
+              <a:gd name="adj1" fmla="val 50000"/>
+            </a:avLst>
+          </a:prstGeom>
+          <a:ln w="38100">
+            <a:tailEnd type="triangle"/>
+          </a:ln>
+        </p:spPr>
+        <p:style>
+          <a:lnRef idx="1">
+            <a:schemeClr val="accent1"/>
+          </a:lnRef>
+          <a:fillRef idx="0">
+            <a:schemeClr val="accent1"/>
+          </a:fillRef>
+          <a:effectRef idx="0">
+            <a:schemeClr val="accent1"/>
+          </a:effectRef>
+          <a:fontRef idx="minor">
+            <a:schemeClr val="tx1"/>
+          </a:fontRef>
+        </p:style>
+      </p:cxnSp>
+      <p:cxnSp>
+        <p:nvCxnSpPr>
+          <p:cNvPr id="50" name="Connector: Curved 49">
+            <a:extLst>
+              <a:ext uri="{FF2B5EF4-FFF2-40B4-BE49-F238E27FC236}">
+                <a16:creationId xmlns:a16="http://schemas.microsoft.com/office/drawing/2014/main" id="{BC4C2B76-8D2A-327A-A433-0A392D7E49E6}"/>
+              </a:ext>
+            </a:extLst>
+          </p:cNvPr>
+          <p:cNvCxnSpPr>
+            <a:cxnSpLocks/>
+            <a:stCxn id="33" idx="1"/>
+            <a:endCxn id="35" idx="1"/>
+          </p:cNvCxnSpPr>
+          <p:nvPr/>
+        </p:nvCxnSpPr>
+        <p:spPr>
+          <a:xfrm rot="10800000" flipV="1">
+            <a:off x="3977995" y="1606452"/>
+            <a:ext cx="12700" cy="2192326"/>
+          </a:xfrm>
+          <a:prstGeom prst="curvedConnector3">
+            <a:avLst>
+              <a:gd name="adj1" fmla="val 4933339"/>
+            </a:avLst>
+          </a:prstGeom>
+          <a:ln w="38100">
+            <a:tailEnd type="triangle"/>
+          </a:ln>
+        </p:spPr>
+        <p:style>
+          <a:lnRef idx="1">
+            <a:schemeClr val="accent1"/>
+          </a:lnRef>
+          <a:fillRef idx="0">
+            <a:schemeClr val="accent1"/>
+          </a:fillRef>
+          <a:effectRef idx="0">
+            <a:schemeClr val="accent1"/>
+          </a:effectRef>
+          <a:fontRef idx="minor">
+            <a:schemeClr val="tx1"/>
+          </a:fontRef>
+        </p:style>
+      </p:cxnSp>
+      <p:cxnSp>
+        <p:nvCxnSpPr>
+          <p:cNvPr id="56" name="Connector: Curved 55">
+            <a:extLst>
+              <a:ext uri="{FF2B5EF4-FFF2-40B4-BE49-F238E27FC236}">
+                <a16:creationId xmlns:a16="http://schemas.microsoft.com/office/drawing/2014/main" id="{98649DCC-5544-CAAB-C85B-640D358926EE}"/>
+              </a:ext>
+            </a:extLst>
+          </p:cNvPr>
+          <p:cNvCxnSpPr>
+            <a:cxnSpLocks/>
+            <a:stCxn id="32" idx="2"/>
+            <a:endCxn id="35" idx="1"/>
+          </p:cNvCxnSpPr>
+          <p:nvPr/>
+        </p:nvCxnSpPr>
+        <p:spPr>
+          <a:xfrm rot="16200000" flipH="1">
+            <a:off x="2300761" y="2121543"/>
+            <a:ext cx="1657877" cy="1696592"/>
+          </a:xfrm>
+          <a:prstGeom prst="curvedConnector2">
+            <a:avLst/>
+          </a:prstGeom>
+          <a:ln w="38100">
+            <a:tailEnd type="triangle"/>
+          </a:ln>
+        </p:spPr>
+        <p:style>
+          <a:lnRef idx="1">
+            <a:schemeClr val="accent1"/>
+          </a:lnRef>
+          <a:fillRef idx="0">
+            <a:schemeClr val="accent1"/>
+          </a:fillRef>
+          <a:effectRef idx="0">
+            <a:schemeClr val="accent1"/>
+          </a:effectRef>
+          <a:fontRef idx="minor">
+            <a:schemeClr val="tx1"/>
+          </a:fontRef>
+        </p:style>
+      </p:cxnSp>
+      <p:sp>
+        <p:nvSpPr>
+          <p:cNvPr id="59" name="TextBox 58">
+            <a:extLst>
+              <a:ext uri="{FF2B5EF4-FFF2-40B4-BE49-F238E27FC236}">
+                <a16:creationId xmlns:a16="http://schemas.microsoft.com/office/drawing/2014/main" id="{D3E7D6AC-7CDC-6B86-D95C-8894F1FD6169}"/>
+              </a:ext>
+            </a:extLst>
+          </p:cNvPr>
+          <p:cNvSpPr txBox="1"/>
+          <p:nvPr/>
+        </p:nvSpPr>
+        <p:spPr>
+          <a:xfrm>
+            <a:off x="2456005" y="2971484"/>
+            <a:ext cx="1177993" cy="1169551"/>
+          </a:xfrm>
+          <a:prstGeom prst="rect">
+            <a:avLst/>
+          </a:prstGeom>
+          <a:noFill/>
+        </p:spPr>
+        <p:txBody>
+          <a:bodyPr wrap="square" rtlCol="0">
+            <a:spAutoFit/>
+          </a:bodyPr>
+          <a:lstStyle/>
+          <a:p>
+            <a:pPr algn="ctr"/>
+            <a:r>
+              <a:rPr lang="en-GB" sz="1400" dirty="0"/>
+              <a:t>User 1 enters details and assigns task then hits </a:t>
+            </a:r>
+            <a:r>
+              <a:rPr lang="en-GB" sz="1400" b="1" dirty="0"/>
+              <a:t>Create</a:t>
+            </a:r>
+          </a:p>
+        </p:txBody>
+      </p:sp>
+      <p:sp>
+        <p:nvSpPr>
+          <p:cNvPr id="69" name="TextBox 68">
+            <a:extLst>
+              <a:ext uri="{FF2B5EF4-FFF2-40B4-BE49-F238E27FC236}">
+                <a16:creationId xmlns:a16="http://schemas.microsoft.com/office/drawing/2014/main" id="{F4247F0F-B4F2-1350-ECAF-8DC95BC6BCF8}"/>
+              </a:ext>
+            </a:extLst>
+          </p:cNvPr>
+          <p:cNvSpPr txBox="1"/>
+          <p:nvPr/>
+        </p:nvSpPr>
+        <p:spPr>
+          <a:xfrm>
+            <a:off x="2930613" y="1979365"/>
+            <a:ext cx="1177993" cy="954107"/>
+          </a:xfrm>
+          <a:prstGeom prst="rect">
+            <a:avLst/>
+          </a:prstGeom>
+          <a:noFill/>
+        </p:spPr>
+        <p:txBody>
+          <a:bodyPr wrap="square" rtlCol="0">
+            <a:spAutoFit/>
+          </a:bodyPr>
+          <a:lstStyle/>
+          <a:p>
+            <a:pPr algn="ctr"/>
+            <a:r>
+              <a:rPr lang="en-GB" sz="1400" dirty="0"/>
+              <a:t>User 1 or 2 assigns task then hits </a:t>
+            </a:r>
+            <a:r>
+              <a:rPr lang="en-GB" sz="1400" b="1" dirty="0"/>
+              <a:t>Assign</a:t>
+            </a:r>
+          </a:p>
+        </p:txBody>
+      </p:sp>
+      <p:sp>
+        <p:nvSpPr>
+          <p:cNvPr id="71" name="TextBox 70">
+            <a:extLst>
+              <a:ext uri="{FF2B5EF4-FFF2-40B4-BE49-F238E27FC236}">
+                <a16:creationId xmlns:a16="http://schemas.microsoft.com/office/drawing/2014/main" id="{63634060-C15D-EF5A-3FE5-18D10EC2FA74}"/>
+              </a:ext>
+            </a:extLst>
+          </p:cNvPr>
+          <p:cNvSpPr txBox="1"/>
+          <p:nvPr/>
+        </p:nvSpPr>
+        <p:spPr>
+          <a:xfrm>
+            <a:off x="5197696" y="3824697"/>
+            <a:ext cx="1177993" cy="523220"/>
+          </a:xfrm>
+          <a:prstGeom prst="rect">
+            <a:avLst/>
+          </a:prstGeom>
+          <a:noFill/>
+        </p:spPr>
+        <p:txBody>
+          <a:bodyPr wrap="square" rtlCol="0">
+            <a:spAutoFit/>
+          </a:bodyPr>
+          <a:lstStyle/>
+          <a:p>
+            <a:pPr algn="ctr"/>
+            <a:r>
+              <a:rPr lang="en-GB" sz="1400" dirty="0"/>
+              <a:t>Assignee hits </a:t>
+            </a:r>
+            <a:r>
+              <a:rPr lang="en-GB" sz="1400" b="1" dirty="0"/>
+              <a:t>Accept</a:t>
+            </a:r>
+          </a:p>
+        </p:txBody>
+      </p:sp>
+      <p:cxnSp>
+        <p:nvCxnSpPr>
+          <p:cNvPr id="74" name="Connector: Curved 73">
+            <a:extLst>
+              <a:ext uri="{FF2B5EF4-FFF2-40B4-BE49-F238E27FC236}">
+                <a16:creationId xmlns:a16="http://schemas.microsoft.com/office/drawing/2014/main" id="{516E79C6-791A-9FED-3D91-6E0F55A9DA82}"/>
+              </a:ext>
+            </a:extLst>
+          </p:cNvPr>
+          <p:cNvCxnSpPr>
+            <a:cxnSpLocks/>
+            <a:stCxn id="35" idx="3"/>
+            <a:endCxn id="36" idx="1"/>
+          </p:cNvCxnSpPr>
+          <p:nvPr/>
+        </p:nvCxnSpPr>
+        <p:spPr>
+          <a:xfrm>
+            <a:off x="5067214" y="3798778"/>
+            <a:ext cx="1501979" cy="6350"/>
+          </a:xfrm>
+          <a:prstGeom prst="curvedConnector3">
+            <a:avLst>
+              <a:gd name="adj1" fmla="val 50000"/>
+            </a:avLst>
+          </a:prstGeom>
+          <a:ln w="38100">
+            <a:tailEnd type="triangle"/>
+          </a:ln>
+        </p:spPr>
+        <p:style>
+          <a:lnRef idx="1">
+            <a:schemeClr val="accent1"/>
+          </a:lnRef>
+          <a:fillRef idx="0">
+            <a:schemeClr val="accent1"/>
+          </a:fillRef>
+          <a:effectRef idx="0">
+            <a:schemeClr val="accent1"/>
+          </a:effectRef>
+          <a:fontRef idx="minor">
+            <a:schemeClr val="tx1"/>
+          </a:fontRef>
+        </p:style>
+      </p:cxnSp>
+      <p:sp>
+        <p:nvSpPr>
+          <p:cNvPr id="76" name="TextBox 75">
+            <a:extLst>
+              <a:ext uri="{FF2B5EF4-FFF2-40B4-BE49-F238E27FC236}">
+                <a16:creationId xmlns:a16="http://schemas.microsoft.com/office/drawing/2014/main" id="{83EF2B88-DB81-1551-F6D1-E4DFB3DD0DA7}"/>
+              </a:ext>
+            </a:extLst>
+          </p:cNvPr>
+          <p:cNvSpPr txBox="1"/>
+          <p:nvPr/>
+        </p:nvSpPr>
+        <p:spPr>
+          <a:xfrm>
+            <a:off x="7425576" y="1112752"/>
+            <a:ext cx="1293605" cy="954107"/>
+          </a:xfrm>
+          <a:prstGeom prst="rect">
+            <a:avLst/>
+          </a:prstGeom>
+          <a:noFill/>
+        </p:spPr>
+        <p:txBody>
+          <a:bodyPr wrap="square" rtlCol="0">
+            <a:spAutoFit/>
+          </a:bodyPr>
+          <a:lstStyle/>
+          <a:p>
+            <a:pPr algn="ctr"/>
+            <a:r>
+              <a:rPr lang="en-GB" sz="1400" dirty="0"/>
+              <a:t>User 1 or 2 hits </a:t>
+            </a:r>
+            <a:r>
+              <a:rPr lang="en-GB" sz="1400" b="1" dirty="0"/>
+              <a:t>Complete </a:t>
+            </a:r>
+            <a:r>
+              <a:rPr lang="en-GB" sz="1400" dirty="0"/>
+              <a:t>and becomes the Assignee</a:t>
+            </a:r>
+          </a:p>
+        </p:txBody>
+      </p:sp>
+      <p:cxnSp>
+        <p:nvCxnSpPr>
+          <p:cNvPr id="79" name="Connector: Curved 78">
+            <a:extLst>
+              <a:ext uri="{FF2B5EF4-FFF2-40B4-BE49-F238E27FC236}">
+                <a16:creationId xmlns:a16="http://schemas.microsoft.com/office/drawing/2014/main" id="{ECE07A59-3DAE-FD38-4967-72E620DDED8A}"/>
+              </a:ext>
+            </a:extLst>
+          </p:cNvPr>
+          <p:cNvCxnSpPr>
+            <a:cxnSpLocks/>
+            <a:stCxn id="33" idx="3"/>
+            <a:endCxn id="36" idx="0"/>
+          </p:cNvCxnSpPr>
+          <p:nvPr/>
+        </p:nvCxnSpPr>
+        <p:spPr>
+          <a:xfrm>
+            <a:off x="5067214" y="1606452"/>
+            <a:ext cx="2046589" cy="1664227"/>
+          </a:xfrm>
+          <a:prstGeom prst="curvedConnector2">
+            <a:avLst/>
+          </a:prstGeom>
+          <a:ln w="38100">
+            <a:tailEnd type="triangle"/>
+          </a:ln>
+        </p:spPr>
+        <p:style>
+          <a:lnRef idx="1">
+            <a:schemeClr val="accent1"/>
+          </a:lnRef>
+          <a:fillRef idx="0">
+            <a:schemeClr val="accent1"/>
+          </a:fillRef>
+          <a:effectRef idx="0">
+            <a:schemeClr val="accent1"/>
+          </a:effectRef>
+          <a:fontRef idx="minor">
+            <a:schemeClr val="tx1"/>
+          </a:fontRef>
+        </p:style>
+      </p:cxnSp>
+      <p:sp>
+        <p:nvSpPr>
+          <p:cNvPr id="90" name="TextBox 89">
+            <a:extLst>
+              <a:ext uri="{FF2B5EF4-FFF2-40B4-BE49-F238E27FC236}">
+                <a16:creationId xmlns:a16="http://schemas.microsoft.com/office/drawing/2014/main" id="{083BAB83-CF64-86D6-6220-B6A55E13DEF5}"/>
+              </a:ext>
+            </a:extLst>
+          </p:cNvPr>
+          <p:cNvSpPr txBox="1"/>
+          <p:nvPr/>
+        </p:nvSpPr>
+        <p:spPr>
+          <a:xfrm>
+            <a:off x="5072807" y="2897565"/>
+            <a:ext cx="1177993" cy="523220"/>
+          </a:xfrm>
+          <a:prstGeom prst="rect">
+            <a:avLst/>
+          </a:prstGeom>
+          <a:noFill/>
+        </p:spPr>
+        <p:txBody>
+          <a:bodyPr wrap="square" rtlCol="0">
+            <a:spAutoFit/>
+          </a:bodyPr>
+          <a:lstStyle/>
+          <a:p>
+            <a:pPr algn="ctr"/>
+            <a:r>
+              <a:rPr lang="en-GB" sz="1400" dirty="0"/>
+              <a:t>Assignee hits </a:t>
+            </a:r>
+            <a:r>
+              <a:rPr lang="en-GB" sz="1400" b="1" dirty="0"/>
+              <a:t>Reject</a:t>
+            </a:r>
+          </a:p>
+        </p:txBody>
+      </p:sp>
+      <p:sp>
+        <p:nvSpPr>
+          <p:cNvPr id="91" name="TextBox 90">
+            <a:extLst>
+              <a:ext uri="{FF2B5EF4-FFF2-40B4-BE49-F238E27FC236}">
+                <a16:creationId xmlns:a16="http://schemas.microsoft.com/office/drawing/2014/main" id="{2ED2DE68-E42E-9F69-E8E4-9B6E29ED9765}"/>
+              </a:ext>
+            </a:extLst>
+          </p:cNvPr>
+          <p:cNvSpPr txBox="1"/>
+          <p:nvPr/>
+        </p:nvSpPr>
+        <p:spPr>
+          <a:xfrm>
+            <a:off x="7776018" y="3325712"/>
+            <a:ext cx="1177993" cy="523220"/>
+          </a:xfrm>
+          <a:prstGeom prst="rect">
+            <a:avLst/>
+          </a:prstGeom>
+          <a:noFill/>
+        </p:spPr>
+        <p:txBody>
+          <a:bodyPr wrap="square" rtlCol="0">
+            <a:spAutoFit/>
+          </a:bodyPr>
+          <a:lstStyle/>
+          <a:p>
+            <a:pPr algn="ctr"/>
+            <a:r>
+              <a:rPr lang="en-GB" sz="1400" dirty="0"/>
+              <a:t>Assignee hits </a:t>
+            </a:r>
+            <a:r>
+              <a:rPr lang="en-GB" sz="1400" b="1" dirty="0"/>
+              <a:t>Complete</a:t>
+            </a:r>
+          </a:p>
+        </p:txBody>
+      </p:sp>
+      <p:cxnSp>
+        <p:nvCxnSpPr>
+          <p:cNvPr id="92" name="Connector: Curved 91">
+            <a:extLst>
+              <a:ext uri="{FF2B5EF4-FFF2-40B4-BE49-F238E27FC236}">
+                <a16:creationId xmlns:a16="http://schemas.microsoft.com/office/drawing/2014/main" id="{CE6040F0-02CC-13BB-13DB-4EB8E5B57698}"/>
+              </a:ext>
+            </a:extLst>
+          </p:cNvPr>
+          <p:cNvCxnSpPr>
+            <a:cxnSpLocks/>
+            <a:stCxn id="36" idx="3"/>
+            <a:endCxn id="37" idx="1"/>
+          </p:cNvCxnSpPr>
+          <p:nvPr/>
+        </p:nvCxnSpPr>
+        <p:spPr>
+          <a:xfrm>
+            <a:off x="7658412" y="3805128"/>
+            <a:ext cx="1501979" cy="12700"/>
+          </a:xfrm>
+          <a:prstGeom prst="curvedConnector3">
+            <a:avLst>
+              <a:gd name="adj1" fmla="val 50000"/>
+            </a:avLst>
+          </a:prstGeom>
+          <a:ln w="38100">
+            <a:tailEnd type="triangle"/>
+          </a:ln>
+        </p:spPr>
+        <p:style>
+          <a:lnRef idx="1">
+            <a:schemeClr val="accent1"/>
+          </a:lnRef>
+          <a:fillRef idx="0">
+            <a:schemeClr val="accent1"/>
+          </a:fillRef>
+          <a:effectRef idx="0">
+            <a:schemeClr val="accent1"/>
+          </a:effectRef>
+          <a:fontRef idx="minor">
+            <a:schemeClr val="tx1"/>
+          </a:fontRef>
+        </p:style>
+      </p:cxnSp>
+      <p:cxnSp>
+        <p:nvCxnSpPr>
+          <p:cNvPr id="95" name="Connector: Curved 94">
+            <a:extLst>
+              <a:ext uri="{FF2B5EF4-FFF2-40B4-BE49-F238E27FC236}">
+                <a16:creationId xmlns:a16="http://schemas.microsoft.com/office/drawing/2014/main" id="{773C453E-C8C9-9597-0C54-48F3D557B513}"/>
+              </a:ext>
+            </a:extLst>
+          </p:cNvPr>
+          <p:cNvCxnSpPr>
+            <a:cxnSpLocks/>
+            <a:stCxn id="37" idx="3"/>
+            <a:endCxn id="38" idx="3"/>
+          </p:cNvCxnSpPr>
+          <p:nvPr/>
+        </p:nvCxnSpPr>
+        <p:spPr>
+          <a:xfrm>
+            <a:off x="10249610" y="3805128"/>
+            <a:ext cx="12700" cy="2324729"/>
+          </a:xfrm>
+          <a:prstGeom prst="curvedConnector3">
+            <a:avLst>
+              <a:gd name="adj1" fmla="val 7066661"/>
+            </a:avLst>
+          </a:prstGeom>
+          <a:ln w="38100">
+            <a:tailEnd type="triangle"/>
+          </a:ln>
+        </p:spPr>
+        <p:style>
+          <a:lnRef idx="1">
+            <a:schemeClr val="accent1"/>
+          </a:lnRef>
+          <a:fillRef idx="0">
+            <a:schemeClr val="accent1"/>
+          </a:fillRef>
+          <a:effectRef idx="0">
+            <a:schemeClr val="accent1"/>
+          </a:effectRef>
+          <a:fontRef idx="minor">
+            <a:schemeClr val="tx1"/>
+          </a:fontRef>
+        </p:style>
+      </p:cxnSp>
+      <p:sp>
+        <p:nvSpPr>
+          <p:cNvPr id="100" name="TextBox 99">
+            <a:extLst>
+              <a:ext uri="{FF2B5EF4-FFF2-40B4-BE49-F238E27FC236}">
+                <a16:creationId xmlns:a16="http://schemas.microsoft.com/office/drawing/2014/main" id="{5D54B256-90BF-9C23-C6A1-296EE5E338F3}"/>
+              </a:ext>
+            </a:extLst>
+          </p:cNvPr>
+          <p:cNvSpPr txBox="1"/>
+          <p:nvPr/>
+        </p:nvSpPr>
+        <p:spPr>
+          <a:xfrm>
+            <a:off x="10017309" y="4705882"/>
+            <a:ext cx="1177993" cy="738664"/>
+          </a:xfrm>
+          <a:prstGeom prst="rect">
+            <a:avLst/>
+          </a:prstGeom>
+          <a:noFill/>
+        </p:spPr>
+        <p:txBody>
+          <a:bodyPr wrap="square" rtlCol="0">
+            <a:spAutoFit/>
+          </a:bodyPr>
+          <a:lstStyle/>
+          <a:p>
+            <a:pPr algn="ctr"/>
+            <a:r>
+              <a:rPr lang="en-GB" sz="1400" dirty="0"/>
+              <a:t>System archives the task</a:t>
+            </a:r>
+            <a:endParaRPr lang="en-GB" sz="1400" b="1" dirty="0"/>
+          </a:p>
+        </p:txBody>
+      </p:sp>
+      <p:cxnSp>
+        <p:nvCxnSpPr>
+          <p:cNvPr id="110" name="Connector: Curved 109">
+            <a:extLst>
+              <a:ext uri="{FF2B5EF4-FFF2-40B4-BE49-F238E27FC236}">
+                <a16:creationId xmlns:a16="http://schemas.microsoft.com/office/drawing/2014/main" id="{6B9BD5EA-D5FF-33D2-8517-B476A45FC098}"/>
+              </a:ext>
+            </a:extLst>
+          </p:cNvPr>
+          <p:cNvCxnSpPr>
+            <a:cxnSpLocks/>
+            <a:stCxn id="32" idx="2"/>
+            <a:endCxn id="36" idx="2"/>
+          </p:cNvCxnSpPr>
+          <p:nvPr/>
+        </p:nvCxnSpPr>
+        <p:spPr>
+          <a:xfrm rot="16200000" flipH="1">
+            <a:off x="3598266" y="824038"/>
+            <a:ext cx="2198675" cy="4832400"/>
+          </a:xfrm>
+          <a:prstGeom prst="curvedConnector3">
+            <a:avLst>
+              <a:gd name="adj1" fmla="val 160072"/>
+            </a:avLst>
+          </a:prstGeom>
+          <a:ln w="38100">
+            <a:tailEnd type="triangle"/>
+          </a:ln>
+        </p:spPr>
+        <p:style>
+          <a:lnRef idx="1">
+            <a:schemeClr val="accent1"/>
+          </a:lnRef>
+          <a:fillRef idx="0">
+            <a:schemeClr val="accent1"/>
+          </a:fillRef>
+          <a:effectRef idx="0">
+            <a:schemeClr val="accent1"/>
+          </a:effectRef>
+          <a:fontRef idx="minor">
+            <a:schemeClr val="tx1"/>
+          </a:fontRef>
+        </p:style>
+      </p:cxnSp>
+      <p:sp>
+        <p:nvSpPr>
+          <p:cNvPr id="116" name="TextBox 115">
+            <a:extLst>
+              <a:ext uri="{FF2B5EF4-FFF2-40B4-BE49-F238E27FC236}">
+                <a16:creationId xmlns:a16="http://schemas.microsoft.com/office/drawing/2014/main" id="{03178D5F-1D04-9B81-EE00-9A5F8CB3E71C}"/>
+              </a:ext>
+            </a:extLst>
+          </p:cNvPr>
+          <p:cNvSpPr txBox="1"/>
+          <p:nvPr/>
+        </p:nvSpPr>
+        <p:spPr>
+          <a:xfrm>
+            <a:off x="4108606" y="4790997"/>
+            <a:ext cx="1177993" cy="738664"/>
+          </a:xfrm>
+          <a:prstGeom prst="rect">
+            <a:avLst/>
+          </a:prstGeom>
+          <a:noFill/>
+        </p:spPr>
+        <p:txBody>
+          <a:bodyPr wrap="square" rtlCol="0">
+            <a:spAutoFit/>
+          </a:bodyPr>
+          <a:lstStyle/>
+          <a:p>
+            <a:pPr algn="ctr"/>
+            <a:r>
+              <a:rPr lang="en-GB" sz="1400" dirty="0"/>
+              <a:t>User 1 enters details and hits </a:t>
+            </a:r>
+            <a:r>
+              <a:rPr lang="en-GB" sz="1400" b="1" dirty="0"/>
+              <a:t>Accept</a:t>
+            </a:r>
+          </a:p>
+        </p:txBody>
+      </p:sp>
+      <p:cxnSp>
+        <p:nvCxnSpPr>
+          <p:cNvPr id="118" name="Connector: Curved 117">
+            <a:extLst>
+              <a:ext uri="{FF2B5EF4-FFF2-40B4-BE49-F238E27FC236}">
+                <a16:creationId xmlns:a16="http://schemas.microsoft.com/office/drawing/2014/main" id="{6AA8FD5D-61F1-4794-8944-95F732B11FBD}"/>
+              </a:ext>
+            </a:extLst>
+          </p:cNvPr>
+          <p:cNvCxnSpPr>
+            <a:cxnSpLocks/>
+            <a:stCxn id="32" idx="2"/>
+            <a:endCxn id="37" idx="2"/>
+          </p:cNvCxnSpPr>
+          <p:nvPr/>
+        </p:nvCxnSpPr>
+        <p:spPr>
+          <a:xfrm rot="16200000" flipH="1">
+            <a:off x="4893865" y="-471561"/>
+            <a:ext cx="2198675" cy="7423598"/>
+          </a:xfrm>
+          <a:prstGeom prst="curvedConnector3">
+            <a:avLst>
+              <a:gd name="adj1" fmla="val 207438"/>
+            </a:avLst>
+          </a:prstGeom>
+          <a:ln w="38100">
+            <a:tailEnd type="triangle"/>
+          </a:ln>
+        </p:spPr>
+        <p:style>
+          <a:lnRef idx="1">
+            <a:schemeClr val="accent1"/>
+          </a:lnRef>
+          <a:fillRef idx="0">
+            <a:schemeClr val="accent1"/>
+          </a:fillRef>
+          <a:effectRef idx="0">
+            <a:schemeClr val="accent1"/>
+          </a:effectRef>
+          <a:fontRef idx="minor">
+            <a:schemeClr val="tx1"/>
+          </a:fontRef>
+        </p:style>
+      </p:cxnSp>
+      <p:sp>
+        <p:nvSpPr>
+          <p:cNvPr id="119" name="TextBox 118">
+            <a:extLst>
+              <a:ext uri="{FF2B5EF4-FFF2-40B4-BE49-F238E27FC236}">
+                <a16:creationId xmlns:a16="http://schemas.microsoft.com/office/drawing/2014/main" id="{8B06D6E3-13A5-E5C8-EC9F-0BB091609C96}"/>
+              </a:ext>
+            </a:extLst>
+          </p:cNvPr>
+          <p:cNvSpPr txBox="1"/>
+          <p:nvPr/>
+        </p:nvSpPr>
+        <p:spPr>
+          <a:xfrm>
+            <a:off x="6272583" y="5760524"/>
+            <a:ext cx="1345944" cy="738664"/>
+          </a:xfrm>
+          <a:prstGeom prst="rect">
+            <a:avLst/>
+          </a:prstGeom>
+          <a:noFill/>
+        </p:spPr>
+        <p:txBody>
+          <a:bodyPr wrap="square" rtlCol="0">
+            <a:spAutoFit/>
+          </a:bodyPr>
+          <a:lstStyle/>
+          <a:p>
+            <a:pPr algn="ctr"/>
+            <a:r>
+              <a:rPr lang="en-GB" sz="1400" dirty="0"/>
+              <a:t>User 1 enters details and hits </a:t>
+            </a:r>
+            <a:r>
+              <a:rPr lang="en-GB" sz="1400" b="1" dirty="0"/>
+              <a:t>Complete</a:t>
+            </a:r>
+          </a:p>
+        </p:txBody>
+      </p:sp>
+      <p:cxnSp>
+        <p:nvCxnSpPr>
+          <p:cNvPr id="124" name="Connector: Curved 123">
+            <a:extLst>
+              <a:ext uri="{FF2B5EF4-FFF2-40B4-BE49-F238E27FC236}">
+                <a16:creationId xmlns:a16="http://schemas.microsoft.com/office/drawing/2014/main" id="{A699483E-BC3C-AD6C-F859-887E84158F87}"/>
+              </a:ext>
+            </a:extLst>
+          </p:cNvPr>
+          <p:cNvCxnSpPr>
+            <a:cxnSpLocks/>
+            <a:stCxn id="33" idx="3"/>
+            <a:endCxn id="37" idx="0"/>
+          </p:cNvCxnSpPr>
+          <p:nvPr/>
+        </p:nvCxnSpPr>
+        <p:spPr>
+          <a:xfrm>
+            <a:off x="5067214" y="1606452"/>
+            <a:ext cx="4637787" cy="1664227"/>
+          </a:xfrm>
+          <a:prstGeom prst="curvedConnector2">
+            <a:avLst/>
+          </a:prstGeom>
+          <a:ln w="38100">
+            <a:tailEnd type="triangle"/>
+          </a:ln>
+        </p:spPr>
+        <p:style>
+          <a:lnRef idx="1">
+            <a:schemeClr val="accent1"/>
+          </a:lnRef>
+          <a:fillRef idx="0">
+            <a:schemeClr val="accent1"/>
+          </a:fillRef>
+          <a:effectRef idx="0">
+            <a:schemeClr val="accent1"/>
+          </a:effectRef>
+          <a:fontRef idx="minor">
+            <a:schemeClr val="tx1"/>
+          </a:fontRef>
+        </p:style>
+      </p:cxnSp>
+      <p:cxnSp>
+        <p:nvCxnSpPr>
+          <p:cNvPr id="127" name="Connector: Curved 126">
+            <a:extLst>
+              <a:ext uri="{FF2B5EF4-FFF2-40B4-BE49-F238E27FC236}">
+                <a16:creationId xmlns:a16="http://schemas.microsoft.com/office/drawing/2014/main" id="{F4C151B6-DDA8-B3EE-E25F-1F9A013F0C6B}"/>
+              </a:ext>
+            </a:extLst>
+          </p:cNvPr>
+          <p:cNvCxnSpPr>
+            <a:cxnSpLocks/>
+            <a:stCxn id="35" idx="2"/>
+            <a:endCxn id="37" idx="2"/>
+          </p:cNvCxnSpPr>
+          <p:nvPr/>
+        </p:nvCxnSpPr>
+        <p:spPr>
+          <a:xfrm rot="16200000" flipH="1">
+            <a:off x="7110628" y="1745203"/>
+            <a:ext cx="6350" cy="5182396"/>
+          </a:xfrm>
+          <a:prstGeom prst="curvedConnector3">
+            <a:avLst>
+              <a:gd name="adj1" fmla="val 10900000"/>
+            </a:avLst>
+          </a:prstGeom>
+          <a:ln w="38100">
+            <a:tailEnd type="triangle"/>
+          </a:ln>
+        </p:spPr>
+        <p:style>
+          <a:lnRef idx="1">
+            <a:schemeClr val="accent1"/>
+          </a:lnRef>
+          <a:fillRef idx="0">
+            <a:schemeClr val="accent1"/>
+          </a:fillRef>
+          <a:effectRef idx="0">
+            <a:schemeClr val="accent1"/>
+          </a:effectRef>
+          <a:fontRef idx="minor">
+            <a:schemeClr val="tx1"/>
+          </a:fontRef>
+        </p:style>
+      </p:cxnSp>
+      <p:sp>
+        <p:nvSpPr>
+          <p:cNvPr id="131" name="TextBox 130">
+            <a:extLst>
+              <a:ext uri="{FF2B5EF4-FFF2-40B4-BE49-F238E27FC236}">
+                <a16:creationId xmlns:a16="http://schemas.microsoft.com/office/drawing/2014/main" id="{BED68833-EFF6-3826-9EBC-3F1A88FEFD31}"/>
+              </a:ext>
+            </a:extLst>
+          </p:cNvPr>
+          <p:cNvSpPr txBox="1"/>
+          <p:nvPr/>
+        </p:nvSpPr>
+        <p:spPr>
+          <a:xfrm>
+            <a:off x="7543717" y="4631188"/>
+            <a:ext cx="1177993" cy="523220"/>
+          </a:xfrm>
+          <a:prstGeom prst="rect">
+            <a:avLst/>
+          </a:prstGeom>
+          <a:noFill/>
+        </p:spPr>
+        <p:txBody>
+          <a:bodyPr wrap="square" rtlCol="0">
+            <a:spAutoFit/>
+          </a:bodyPr>
+          <a:lstStyle/>
+          <a:p>
+            <a:pPr algn="ctr"/>
+            <a:r>
+              <a:rPr lang="en-GB" sz="1400" dirty="0"/>
+              <a:t>Assignee hits </a:t>
+            </a:r>
+            <a:r>
+              <a:rPr lang="en-GB" sz="1400" b="1" dirty="0"/>
+              <a:t>Complete</a:t>
+            </a:r>
+          </a:p>
+        </p:txBody>
+      </p:sp>
+      <p:cxnSp>
+        <p:nvCxnSpPr>
+          <p:cNvPr id="132" name="Connector: Curved 131">
+            <a:extLst>
+              <a:ext uri="{FF2B5EF4-FFF2-40B4-BE49-F238E27FC236}">
+                <a16:creationId xmlns:a16="http://schemas.microsoft.com/office/drawing/2014/main" id="{70561526-6E74-E745-4800-E27C1A16EA2B}"/>
+              </a:ext>
+            </a:extLst>
+          </p:cNvPr>
+          <p:cNvCxnSpPr>
+            <a:cxnSpLocks/>
+            <a:stCxn id="36" idx="1"/>
+            <a:endCxn id="33" idx="2"/>
+          </p:cNvCxnSpPr>
+          <p:nvPr/>
+        </p:nvCxnSpPr>
+        <p:spPr>
+          <a:xfrm rot="10800000">
+            <a:off x="4522605" y="2140900"/>
+            <a:ext cx="2046588" cy="1664228"/>
+          </a:xfrm>
+          <a:prstGeom prst="curvedConnector2">
+            <a:avLst/>
+          </a:prstGeom>
+          <a:ln w="38100">
+            <a:tailEnd type="triangle"/>
+          </a:ln>
+        </p:spPr>
+        <p:style>
+          <a:lnRef idx="1">
+            <a:schemeClr val="accent1"/>
+          </a:lnRef>
+          <a:fillRef idx="0">
+            <a:schemeClr val="accent1"/>
+          </a:fillRef>
+          <a:effectRef idx="0">
+            <a:schemeClr val="accent1"/>
+          </a:effectRef>
+          <a:fontRef idx="minor">
+            <a:schemeClr val="tx1"/>
+          </a:fontRef>
+        </p:style>
+      </p:cxnSp>
+      <p:sp>
+        <p:nvSpPr>
+          <p:cNvPr id="136" name="TextBox 135">
+            <a:extLst>
+              <a:ext uri="{FF2B5EF4-FFF2-40B4-BE49-F238E27FC236}">
+                <a16:creationId xmlns:a16="http://schemas.microsoft.com/office/drawing/2014/main" id="{FFBAC561-881F-10C5-5E76-ABD0BF9D5BE5}"/>
+              </a:ext>
+            </a:extLst>
+          </p:cNvPr>
+          <p:cNvSpPr txBox="1"/>
+          <p:nvPr/>
+        </p:nvSpPr>
+        <p:spPr>
+          <a:xfrm>
+            <a:off x="6025790" y="1951281"/>
+            <a:ext cx="1293605" cy="954107"/>
+          </a:xfrm>
+          <a:prstGeom prst="rect">
+            <a:avLst/>
+          </a:prstGeom>
+          <a:noFill/>
+        </p:spPr>
+        <p:txBody>
+          <a:bodyPr wrap="square" rtlCol="0">
+            <a:spAutoFit/>
+          </a:bodyPr>
+          <a:lstStyle/>
+          <a:p>
+            <a:pPr algn="ctr"/>
+            <a:r>
+              <a:rPr lang="en-GB" sz="1400" dirty="0"/>
+              <a:t>User 1 or 2 hits </a:t>
+            </a:r>
+            <a:r>
+              <a:rPr lang="en-GB" sz="1400" b="1" dirty="0"/>
+              <a:t>Accept </a:t>
+            </a:r>
+            <a:r>
+              <a:rPr lang="en-GB" sz="1400" dirty="0"/>
+              <a:t>and becomes the Assignee</a:t>
+            </a:r>
+          </a:p>
+        </p:txBody>
+      </p:sp>
+      <p:sp>
+        <p:nvSpPr>
+          <p:cNvPr id="139" name="TextBox 138">
+            <a:extLst>
+              <a:ext uri="{FF2B5EF4-FFF2-40B4-BE49-F238E27FC236}">
+                <a16:creationId xmlns:a16="http://schemas.microsoft.com/office/drawing/2014/main" id="{C6D3DEA0-D3EF-F6AE-E94F-A6C4260D19AB}"/>
+              </a:ext>
+            </a:extLst>
+          </p:cNvPr>
+          <p:cNvSpPr txBox="1"/>
+          <p:nvPr/>
+        </p:nvSpPr>
+        <p:spPr>
+          <a:xfrm>
+            <a:off x="3896018" y="2488645"/>
+            <a:ext cx="832825" cy="738664"/>
+          </a:xfrm>
+          <a:prstGeom prst="rect">
+            <a:avLst/>
+          </a:prstGeom>
+          <a:noFill/>
+        </p:spPr>
+        <p:txBody>
+          <a:bodyPr wrap="square" rtlCol="0">
+            <a:spAutoFit/>
+          </a:bodyPr>
+          <a:lstStyle/>
+          <a:p>
+            <a:pPr algn="ctr"/>
+            <a:r>
+              <a:rPr lang="en-GB" sz="1400" dirty="0"/>
+              <a:t>Assignee hits </a:t>
+            </a:r>
+            <a:r>
+              <a:rPr lang="en-GB" sz="1400" b="1" dirty="0"/>
+              <a:t>Reject</a:t>
+            </a:r>
+          </a:p>
+        </p:txBody>
+      </p:sp>
+    </p:spTree>
+    <p:extLst>
+      <p:ext uri="{BB962C8B-B14F-4D97-AF65-F5344CB8AC3E}">
+        <p14:creationId xmlns:p14="http://schemas.microsoft.com/office/powerpoint/2010/main" val="3750217515"/>
+      </p:ext>
+    </p:extLst>
+  </p:cSld>
+  <p:clrMapOvr>
+    <a:masterClrMapping/>
+  </p:clrMapOvr>
+</p:sld>
+</file>
+
 <file path=ppt/theme/theme1.xml><?xml version="1.0" encoding="utf-8"?>
 <a:theme xmlns:a="http://schemas.openxmlformats.org/drawingml/2006/main" name="Office Theme">
   <a:themeElements>

</xml_diff>